<commit_message>
Tweaked Session 4 slides.
</commit_message>
<xml_diff>
--- a/slides/session04.pptx
+++ b/slides/session04.pptx
@@ -2221,7 +2221,7 @@
                 <a:latin typeface="Gill Sans"/>
                 <a:cs typeface="Gill Sans"/>
               </a:rPr>
-              <a:t>3</a:t>
+              <a:t>4</a:t>
             </a:r>
             <a:r>
               <a:rPr lang="en-US" sz="3600" dirty="0" smtClean="0">
@@ -2231,7 +2231,17 @@
                 <a:latin typeface="Gill Sans"/>
                 <a:cs typeface="Gill Sans"/>
               </a:rPr>
-              <a:t>: JavaScript – DOM and Events</a:t>
+              <a:t>: </a:t>
+            </a:r>
+            <a:r>
+              <a:rPr lang="en-US" sz="3600" dirty="0" smtClean="0">
+                <a:solidFill>
+                  <a:schemeClr val="bg1"/>
+                </a:solidFill>
+                <a:latin typeface="Gill Sans"/>
+                <a:cs typeface="Gill Sans"/>
+              </a:rPr>
+              <a:t>JavaScript – DOM and Events</a:t>
             </a:r>
             <a:endParaRPr lang="en-US" sz="2400" b="0" dirty="0">
               <a:solidFill>
@@ -2427,11 +2437,7 @@
             <a:pPr lvl="1"/>
             <a:r>
               <a:rPr lang="en-US" dirty="0" smtClean="0"/>
-              <a:t>Get a node’s </a:t>
-            </a:r>
-            <a:r>
-              <a:rPr lang="en-US" dirty="0" smtClean="0"/>
-              <a:t>number of children: </a:t>
+              <a:t>Get a node’s number of children: </a:t>
             </a:r>
             <a:r>
               <a:rPr lang="en-US" dirty="0" err="1" smtClean="0"/>
@@ -2443,11 +2449,7 @@
             <a:pPr lvl="1"/>
             <a:r>
               <a:rPr lang="en-US" dirty="0" smtClean="0"/>
-              <a:t>Natural </a:t>
-            </a:r>
-            <a:r>
-              <a:rPr lang="en-US" dirty="0" smtClean="0"/>
-              <a:t>to iterate over child nodes using for loops</a:t>
+              <a:t>Natural to iterate over child nodes using for loops</a:t>
             </a:r>
             <a:endParaRPr lang="en-US" dirty="0"/>
           </a:p>
@@ -2919,13 +2921,8 @@
           <a:p>
             <a:r>
               <a:rPr lang="en-US" dirty="0" smtClean="0"/>
-              <a:t>Building </a:t>
-            </a:r>
-            <a:r>
-              <a:rPr lang="en-US" dirty="0" smtClean="0"/>
-              <a:t>DOM nodes programmatically:</a:t>
-            </a:r>
-            <a:endParaRPr lang="en-US" dirty="0" smtClean="0"/>
+              <a:t>Building DOM nodes programmatically:</a:t>
+            </a:r>
           </a:p>
           <a:p>
             <a:pPr marL="457129" lvl="1" indent="0">
@@ -3075,7 +3072,6 @@
               <a:rPr lang="en-US" dirty="0" smtClean="0"/>
               <a:t> method to set attributes</a:t>
             </a:r>
-            <a:endParaRPr lang="en-US" dirty="0" smtClean="0"/>
           </a:p>
           <a:p>
             <a:endParaRPr lang="en-US" dirty="0"/>
@@ -3171,11 +3167,7 @@
             </a:r>
             <a:r>
               <a:rPr lang="en-US" dirty="0" smtClean="0"/>
-              <a:t> method </a:t>
-            </a:r>
-            <a:r>
-              <a:rPr lang="en-US" dirty="0" smtClean="0"/>
-              <a:t>in its parent:</a:t>
+              <a:t> method in its parent:</a:t>
             </a:r>
           </a:p>
           <a:p>
@@ -4342,11 +4334,7 @@
             </a:r>
             <a:r>
               <a:rPr lang="en-US" sz="1000" b="0" dirty="0" smtClean="0"/>
-              <a:t>Wikipedia </a:t>
-            </a:r>
-            <a:r>
-              <a:rPr lang="en-US" sz="1000" b="0" dirty="0" smtClean="0"/>
-              <a:t>(Form (Document))</a:t>
+              <a:t>Wikipedia (Form (Document))</a:t>
             </a:r>
             <a:endParaRPr lang="en-US" sz="1000" b="0" dirty="0"/>
           </a:p>
@@ -4502,11 +4490,7 @@
             </a:r>
             <a:r>
               <a:rPr lang="en-US" sz="1000" b="0" dirty="0" smtClean="0"/>
-              <a:t>Wikipedia </a:t>
-            </a:r>
-            <a:r>
-              <a:rPr lang="en-US" sz="1000" b="0" dirty="0" smtClean="0"/>
-              <a:t>(Construction)</a:t>
+              <a:t>Wikipedia (Construction)</a:t>
             </a:r>
             <a:endParaRPr lang="en-US" sz="1000" b="0" dirty="0"/>
           </a:p>

</xml_diff>

<commit_message>
Final version of slides for session 4
</commit_message>
<xml_diff>
--- a/slides/session04.pptx
+++ b/slides/session04.pptx
@@ -2169,25 +2169,8 @@
                 <a:latin typeface="Gill Sans"/>
                 <a:cs typeface="Gill Sans"/>
               </a:rPr>
-              <a:t>Thursday, September </a:t>
-            </a:r>
-            <a:r>
-              <a:rPr lang="en-US" sz="2400" b="0" kern="0" dirty="0" smtClean="0">
-                <a:solidFill>
-                  <a:schemeClr val="bg1"/>
-                </a:solidFill>
-                <a:latin typeface="Gill Sans"/>
-                <a:cs typeface="Gill Sans"/>
-              </a:rPr>
-              <a:t>26, 2013</a:t>
-            </a:r>
-            <a:endParaRPr lang="en-US" sz="2400" b="0" kern="0" dirty="0" smtClean="0">
-              <a:solidFill>
-                <a:schemeClr val="bg1"/>
-              </a:solidFill>
-              <a:latin typeface="Gill Sans"/>
-              <a:cs typeface="Gill Sans"/>
-            </a:endParaRPr>
+              <a:t>Thursday, September 26, 2013</a:t>
+            </a:r>
           </a:p>
         </p:txBody>
       </p:sp>
@@ -3081,10 +3064,45 @@
             </a:r>
           </a:p>
           <a:p>
-            <a:endParaRPr lang="en-US" dirty="0"/>
-          </a:p>
-          <a:p>
-            <a:endParaRPr lang="en-US" dirty="0"/>
+            <a:pPr marL="457129" lvl="1" indent="0">
+              <a:buNone/>
+            </a:pPr>
+            <a:r>
+              <a:rPr lang="en-US" dirty="0" err="1"/>
+              <a:t>document.getElementById</a:t>
+            </a:r>
+            <a:r>
+              <a:rPr lang="en-US" dirty="0"/>
+              <a:t>("</a:t>
+            </a:r>
+            <a:r>
+              <a:rPr lang="en-US" dirty="0" err="1"/>
+              <a:t>para</a:t>
+            </a:r>
+            <a:r>
+              <a:rPr lang="en-US" dirty="0"/>
+              <a:t>").</a:t>
+            </a:r>
+            <a:r>
+              <a:rPr lang="en-US" dirty="0" err="1"/>
+              <a:t>setAttribute</a:t>
+            </a:r>
+            <a:r>
+              <a:rPr lang="en-US" dirty="0"/>
+              <a:t>("style", "font-family: </a:t>
+            </a:r>
+            <a:r>
+              <a:rPr lang="en-US" dirty="0" err="1" smtClean="0"/>
+              <a:t>arial</a:t>
+            </a:r>
+            <a:r>
+              <a:rPr lang="en-US" dirty="0" smtClean="0"/>
+              <a:t>"</a:t>
+            </a:r>
+            <a:r>
+              <a:rPr lang="en-US" dirty="0"/>
+              <a:t>);</a:t>
+            </a:r>
           </a:p>
         </p:txBody>
       </p:sp>

</xml_diff>